<commit_message>
Chap03: Correction done until III.3
</commit_message>
<xml_diff>
--- a/03-h-Mn/Pictures/StrainAutocorPump.pptx
+++ b/03-h-Mn/Pictures/StrainAutocorPump.pptx
@@ -7,13 +7,13 @@
   <p:sldIdLst>
     <p:sldId id="256" r:id="rId2"/>
   </p:sldIdLst>
-  <p:sldSz cx="7272338" cy="5329238"/>
+  <p:sldSz cx="7561263" cy="7524750"/>
   <p:notesSz cx="6858000" cy="9144000"/>
   <p:defaultTextStyle>
     <a:defPPr>
       <a:defRPr lang="fr-FR"/>
     </a:defPPr>
-    <a:lvl1pPr marL="0" algn="l" defTabSz="720090" rtl="0" eaLnBrk="1" latinLnBrk="0" hangingPunct="1">
+    <a:lvl1pPr marL="0" algn="l" defTabSz="743349" rtl="0" eaLnBrk="1" latinLnBrk="0" hangingPunct="1">
       <a:defRPr sz="1400" kern="1200">
         <a:solidFill>
           <a:schemeClr val="tx1"/>
@@ -23,7 +23,7 @@
         <a:cs typeface="+mn-cs"/>
       </a:defRPr>
     </a:lvl1pPr>
-    <a:lvl2pPr marL="360045" algn="l" defTabSz="720090" rtl="0" eaLnBrk="1" latinLnBrk="0" hangingPunct="1">
+    <a:lvl2pPr marL="371674" algn="l" defTabSz="743349" rtl="0" eaLnBrk="1" latinLnBrk="0" hangingPunct="1">
       <a:defRPr sz="1400" kern="1200">
         <a:solidFill>
           <a:schemeClr val="tx1"/>
@@ -33,7 +33,7 @@
         <a:cs typeface="+mn-cs"/>
       </a:defRPr>
     </a:lvl2pPr>
-    <a:lvl3pPr marL="720090" algn="l" defTabSz="720090" rtl="0" eaLnBrk="1" latinLnBrk="0" hangingPunct="1">
+    <a:lvl3pPr marL="743349" algn="l" defTabSz="743349" rtl="0" eaLnBrk="1" latinLnBrk="0" hangingPunct="1">
       <a:defRPr sz="1400" kern="1200">
         <a:solidFill>
           <a:schemeClr val="tx1"/>
@@ -43,7 +43,7 @@
         <a:cs typeface="+mn-cs"/>
       </a:defRPr>
     </a:lvl3pPr>
-    <a:lvl4pPr marL="1080135" algn="l" defTabSz="720090" rtl="0" eaLnBrk="1" latinLnBrk="0" hangingPunct="1">
+    <a:lvl4pPr marL="1115023" algn="l" defTabSz="743349" rtl="0" eaLnBrk="1" latinLnBrk="0" hangingPunct="1">
       <a:defRPr sz="1400" kern="1200">
         <a:solidFill>
           <a:schemeClr val="tx1"/>
@@ -53,7 +53,7 @@
         <a:cs typeface="+mn-cs"/>
       </a:defRPr>
     </a:lvl4pPr>
-    <a:lvl5pPr marL="1440180" algn="l" defTabSz="720090" rtl="0" eaLnBrk="1" latinLnBrk="0" hangingPunct="1">
+    <a:lvl5pPr marL="1486698" algn="l" defTabSz="743349" rtl="0" eaLnBrk="1" latinLnBrk="0" hangingPunct="1">
       <a:defRPr sz="1400" kern="1200">
         <a:solidFill>
           <a:schemeClr val="tx1"/>
@@ -63,7 +63,7 @@
         <a:cs typeface="+mn-cs"/>
       </a:defRPr>
     </a:lvl5pPr>
-    <a:lvl6pPr marL="1800225" algn="l" defTabSz="720090" rtl="0" eaLnBrk="1" latinLnBrk="0" hangingPunct="1">
+    <a:lvl6pPr marL="1858372" algn="l" defTabSz="743349" rtl="0" eaLnBrk="1" latinLnBrk="0" hangingPunct="1">
       <a:defRPr sz="1400" kern="1200">
         <a:solidFill>
           <a:schemeClr val="tx1"/>
@@ -73,7 +73,7 @@
         <a:cs typeface="+mn-cs"/>
       </a:defRPr>
     </a:lvl6pPr>
-    <a:lvl7pPr marL="2160270" algn="l" defTabSz="720090" rtl="0" eaLnBrk="1" latinLnBrk="0" hangingPunct="1">
+    <a:lvl7pPr marL="2230047" algn="l" defTabSz="743349" rtl="0" eaLnBrk="1" latinLnBrk="0" hangingPunct="1">
       <a:defRPr sz="1400" kern="1200">
         <a:solidFill>
           <a:schemeClr val="tx1"/>
@@ -83,7 +83,7 @@
         <a:cs typeface="+mn-cs"/>
       </a:defRPr>
     </a:lvl7pPr>
-    <a:lvl8pPr marL="2520315" algn="l" defTabSz="720090" rtl="0" eaLnBrk="1" latinLnBrk="0" hangingPunct="1">
+    <a:lvl8pPr marL="2601721" algn="l" defTabSz="743349" rtl="0" eaLnBrk="1" latinLnBrk="0" hangingPunct="1">
       <a:defRPr sz="1400" kern="1200">
         <a:solidFill>
           <a:schemeClr val="tx1"/>
@@ -93,7 +93,7 @@
         <a:cs typeface="+mn-cs"/>
       </a:defRPr>
     </a:lvl8pPr>
-    <a:lvl9pPr marL="2880360" algn="l" defTabSz="720090" rtl="0" eaLnBrk="1" latinLnBrk="0" hangingPunct="1">
+    <a:lvl9pPr marL="2973396" algn="l" defTabSz="743349" rtl="0" eaLnBrk="1" latinLnBrk="0" hangingPunct="1">
       <a:defRPr sz="1400" kern="1200">
         <a:solidFill>
           <a:schemeClr val="tx1"/>
@@ -136,8 +136,8 @@
         </p:nvSpPr>
         <p:spPr>
           <a:xfrm>
-            <a:off x="545427" y="1655520"/>
-            <a:ext cx="6181487" cy="1142332"/>
+            <a:off x="567100" y="2337554"/>
+            <a:ext cx="6427073" cy="1612944"/>
           </a:xfrm>
         </p:spPr>
         <p:txBody>
@@ -164,8 +164,8 @@
         </p:nvSpPr>
         <p:spPr>
           <a:xfrm>
-            <a:off x="1090852" y="3019902"/>
-            <a:ext cx="5090637" cy="1361917"/>
+            <a:off x="1134194" y="4264028"/>
+            <a:ext cx="5292885" cy="1922994"/>
           </a:xfrm>
         </p:spPr>
         <p:txBody>
@@ -181,7 +181,7 @@
                 </a:solidFill>
               </a:defRPr>
             </a:lvl1pPr>
-            <a:lvl2pPr marL="360045" indent="0" algn="ctr">
+            <a:lvl2pPr marL="371674" indent="0" algn="ctr">
               <a:buNone/>
               <a:defRPr>
                 <a:solidFill>
@@ -191,7 +191,7 @@
                 </a:solidFill>
               </a:defRPr>
             </a:lvl2pPr>
-            <a:lvl3pPr marL="720090" indent="0" algn="ctr">
+            <a:lvl3pPr marL="743349" indent="0" algn="ctr">
               <a:buNone/>
               <a:defRPr>
                 <a:solidFill>
@@ -201,7 +201,7 @@
                 </a:solidFill>
               </a:defRPr>
             </a:lvl3pPr>
-            <a:lvl4pPr marL="1080135" indent="0" algn="ctr">
+            <a:lvl4pPr marL="1115023" indent="0" algn="ctr">
               <a:buNone/>
               <a:defRPr>
                 <a:solidFill>
@@ -211,7 +211,7 @@
                 </a:solidFill>
               </a:defRPr>
             </a:lvl4pPr>
-            <a:lvl5pPr marL="1440180" indent="0" algn="ctr">
+            <a:lvl5pPr marL="1486698" indent="0" algn="ctr">
               <a:buNone/>
               <a:defRPr>
                 <a:solidFill>
@@ -221,7 +221,7 @@
                 </a:solidFill>
               </a:defRPr>
             </a:lvl5pPr>
-            <a:lvl6pPr marL="1800225" indent="0" algn="ctr">
+            <a:lvl6pPr marL="1858372" indent="0" algn="ctr">
               <a:buNone/>
               <a:defRPr>
                 <a:solidFill>
@@ -231,7 +231,7 @@
                 </a:solidFill>
               </a:defRPr>
             </a:lvl6pPr>
-            <a:lvl7pPr marL="2160270" indent="0" algn="ctr">
+            <a:lvl7pPr marL="2230047" indent="0" algn="ctr">
               <a:buNone/>
               <a:defRPr>
                 <a:solidFill>
@@ -241,7 +241,7 @@
                 </a:solidFill>
               </a:defRPr>
             </a:lvl7pPr>
-            <a:lvl8pPr marL="2520315" indent="0" algn="ctr">
+            <a:lvl8pPr marL="2601721" indent="0" algn="ctr">
               <a:buNone/>
               <a:defRPr>
                 <a:solidFill>
@@ -251,7 +251,7 @@
                 </a:solidFill>
               </a:defRPr>
             </a:lvl8pPr>
-            <a:lvl9pPr marL="2880360" indent="0" algn="ctr">
+            <a:lvl9pPr marL="2973396" indent="0" algn="ctr">
               <a:buNone/>
               <a:defRPr>
                 <a:solidFill>
@@ -288,7 +288,7 @@
           <a:p>
             <a:fld id="{0259FF92-1362-455E-ACBC-70B42DC48170}" type="datetimeFigureOut">
               <a:rPr lang="fr-FR" smtClean="0"/>
-              <a:t>12/07/2017</a:t>
+              <a:t>17/10/2017</a:t>
             </a:fld>
             <a:endParaRPr lang="fr-FR"/>
           </a:p>
@@ -458,7 +458,7 @@
           <a:p>
             <a:fld id="{0259FF92-1362-455E-ACBC-70B42DC48170}" type="datetimeFigureOut">
               <a:rPr lang="fr-FR" smtClean="0"/>
-              <a:t>12/07/2017</a:t>
+              <a:t>17/10/2017</a:t>
             </a:fld>
             <a:endParaRPr lang="fr-FR"/>
           </a:p>
@@ -548,8 +548,8 @@
         </p:nvSpPr>
         <p:spPr>
           <a:xfrm>
-            <a:off x="4152558" y="167773"/>
-            <a:ext cx="1287809" cy="3581199"/>
+            <a:off x="4317543" y="236892"/>
+            <a:ext cx="1338973" cy="5056564"/>
           </a:xfrm>
         </p:spPr>
         <p:txBody>
@@ -576,8 +576,8 @@
         </p:nvSpPr>
         <p:spPr>
           <a:xfrm>
-            <a:off x="286604" y="167773"/>
-            <a:ext cx="3744749" cy="3581199"/>
+            <a:off x="297997" y="236892"/>
+            <a:ext cx="3893525" cy="5056564"/>
           </a:xfrm>
         </p:spPr>
         <p:txBody>
@@ -638,7 +638,7 @@
           <a:p>
             <a:fld id="{0259FF92-1362-455E-ACBC-70B42DC48170}" type="datetimeFigureOut">
               <a:rPr lang="fr-FR" smtClean="0"/>
-              <a:t>12/07/2017</a:t>
+              <a:t>17/10/2017</a:t>
             </a:fld>
             <a:endParaRPr lang="fr-FR"/>
           </a:p>
@@ -808,7 +808,7 @@
           <a:p>
             <a:fld id="{0259FF92-1362-455E-ACBC-70B42DC48170}" type="datetimeFigureOut">
               <a:rPr lang="fr-FR" smtClean="0"/>
-              <a:t>12/07/2017</a:t>
+              <a:t>17/10/2017</a:t>
             </a:fld>
             <a:endParaRPr lang="fr-FR"/>
           </a:p>
@@ -898,15 +898,15 @@
         </p:nvSpPr>
         <p:spPr>
           <a:xfrm>
-            <a:off x="574467" y="3424528"/>
-            <a:ext cx="6181487" cy="1058447"/>
+            <a:off x="597296" y="4835349"/>
+            <a:ext cx="6427073" cy="1494500"/>
           </a:xfrm>
         </p:spPr>
         <p:txBody>
           <a:bodyPr anchor="t"/>
           <a:lstStyle>
             <a:lvl1pPr algn="l">
-              <a:defRPr sz="3200" b="1" cap="all"/>
+              <a:defRPr sz="3300" b="1" cap="all"/>
             </a:lvl1pPr>
           </a:lstStyle>
           <a:p>
@@ -930,8 +930,8 @@
         </p:nvSpPr>
         <p:spPr>
           <a:xfrm>
-            <a:off x="574467" y="2258761"/>
-            <a:ext cx="6181487" cy="1165770"/>
+            <a:off x="597296" y="3189315"/>
+            <a:ext cx="6427073" cy="1646038"/>
           </a:xfrm>
         </p:spPr>
         <p:txBody>
@@ -939,7 +939,7 @@
           <a:lstStyle>
             <a:lvl1pPr marL="0" indent="0">
               <a:buNone/>
-              <a:defRPr sz="1600">
+              <a:defRPr sz="1700">
                 <a:solidFill>
                   <a:schemeClr val="tx1">
                     <a:tint val="75000"/>
@@ -947,7 +947,7 @@
                 </a:solidFill>
               </a:defRPr>
             </a:lvl1pPr>
-            <a:lvl2pPr marL="360045" indent="0">
+            <a:lvl2pPr marL="371674" indent="0">
               <a:buNone/>
               <a:defRPr sz="1400">
                 <a:solidFill>
@@ -957,7 +957,7 @@
                 </a:solidFill>
               </a:defRPr>
             </a:lvl2pPr>
-            <a:lvl3pPr marL="720090" indent="0">
+            <a:lvl3pPr marL="743349" indent="0">
               <a:buNone/>
               <a:defRPr sz="1300">
                 <a:solidFill>
@@ -967,7 +967,7 @@
                 </a:solidFill>
               </a:defRPr>
             </a:lvl3pPr>
-            <a:lvl4pPr marL="1080135" indent="0">
+            <a:lvl4pPr marL="1115023" indent="0">
               <a:buNone/>
               <a:defRPr sz="1100">
                 <a:solidFill>
@@ -977,7 +977,7 @@
                 </a:solidFill>
               </a:defRPr>
             </a:lvl4pPr>
-            <a:lvl5pPr marL="1440180" indent="0">
+            <a:lvl5pPr marL="1486698" indent="0">
               <a:buNone/>
               <a:defRPr sz="1100">
                 <a:solidFill>
@@ -987,7 +987,7 @@
                 </a:solidFill>
               </a:defRPr>
             </a:lvl5pPr>
-            <a:lvl6pPr marL="1800225" indent="0">
+            <a:lvl6pPr marL="1858372" indent="0">
               <a:buNone/>
               <a:defRPr sz="1100">
                 <a:solidFill>
@@ -997,7 +997,7 @@
                 </a:solidFill>
               </a:defRPr>
             </a:lvl6pPr>
-            <a:lvl7pPr marL="2160270" indent="0">
+            <a:lvl7pPr marL="2230047" indent="0">
               <a:buNone/>
               <a:defRPr sz="1100">
                 <a:solidFill>
@@ -1007,7 +1007,7 @@
                 </a:solidFill>
               </a:defRPr>
             </a:lvl7pPr>
-            <a:lvl8pPr marL="2520315" indent="0">
+            <a:lvl8pPr marL="2601721" indent="0">
               <a:buNone/>
               <a:defRPr sz="1100">
                 <a:solidFill>
@@ -1017,7 +1017,7 @@
                 </a:solidFill>
               </a:defRPr>
             </a:lvl8pPr>
-            <a:lvl9pPr marL="2880360" indent="0">
+            <a:lvl9pPr marL="2973396" indent="0">
               <a:buNone/>
               <a:defRPr sz="1100">
                 <a:solidFill>
@@ -1054,7 +1054,7 @@
           <a:p>
             <a:fld id="{0259FF92-1362-455E-ACBC-70B42DC48170}" type="datetimeFigureOut">
               <a:rPr lang="fr-FR" smtClean="0"/>
-              <a:t>12/07/2017</a:t>
+              <a:t>17/10/2017</a:t>
             </a:fld>
             <a:endParaRPr lang="fr-FR"/>
           </a:p>
@@ -1167,21 +1167,21 @@
         </p:nvSpPr>
         <p:spPr>
           <a:xfrm>
-            <a:off x="286604" y="979495"/>
-            <a:ext cx="2516279" cy="2769477"/>
+            <a:off x="297997" y="1383024"/>
+            <a:ext cx="2616249" cy="3910433"/>
           </a:xfrm>
         </p:spPr>
         <p:txBody>
           <a:bodyPr/>
           <a:lstStyle>
             <a:lvl1pPr>
-              <a:defRPr sz="2200"/>
+              <a:defRPr sz="2300"/>
             </a:lvl1pPr>
             <a:lvl2pPr>
-              <a:defRPr sz="1900"/>
+              <a:defRPr sz="2000"/>
             </a:lvl2pPr>
             <a:lvl3pPr>
-              <a:defRPr sz="1600"/>
+              <a:defRPr sz="1700"/>
             </a:lvl3pPr>
             <a:lvl4pPr>
               <a:defRPr sz="1400"/>
@@ -1252,21 +1252,21 @@
         </p:nvSpPr>
         <p:spPr>
           <a:xfrm>
-            <a:off x="2924086" y="979495"/>
-            <a:ext cx="2516280" cy="2769477"/>
+            <a:off x="3040258" y="1383024"/>
+            <a:ext cx="2616250" cy="3910433"/>
           </a:xfrm>
         </p:spPr>
         <p:txBody>
           <a:bodyPr/>
           <a:lstStyle>
             <a:lvl1pPr>
-              <a:defRPr sz="2200"/>
+              <a:defRPr sz="2300"/>
             </a:lvl1pPr>
             <a:lvl2pPr>
-              <a:defRPr sz="1900"/>
+              <a:defRPr sz="2000"/>
             </a:lvl2pPr>
             <a:lvl3pPr>
-              <a:defRPr sz="1600"/>
+              <a:defRPr sz="1700"/>
             </a:lvl3pPr>
             <a:lvl4pPr>
               <a:defRPr sz="1400"/>
@@ -1342,7 +1342,7 @@
           <a:p>
             <a:fld id="{0259FF92-1362-455E-ACBC-70B42DC48170}" type="datetimeFigureOut">
               <a:rPr lang="fr-FR" smtClean="0"/>
-              <a:t>12/07/2017</a:t>
+              <a:t>17/10/2017</a:t>
             </a:fld>
             <a:endParaRPr lang="fr-FR"/>
           </a:p>
@@ -1432,8 +1432,8 @@
         </p:nvSpPr>
         <p:spPr>
           <a:xfrm>
-            <a:off x="363617" y="213418"/>
-            <a:ext cx="6545104" cy="888207"/>
+            <a:off x="378064" y="301345"/>
+            <a:ext cx="6805136" cy="1254125"/>
           </a:xfrm>
         </p:spPr>
         <p:txBody>
@@ -1464,8 +1464,8 @@
         </p:nvSpPr>
         <p:spPr>
           <a:xfrm>
-            <a:off x="363617" y="1192912"/>
-            <a:ext cx="3213212" cy="497150"/>
+            <a:off x="378063" y="1684363"/>
+            <a:ext cx="3340871" cy="701964"/>
           </a:xfrm>
         </p:spPr>
         <p:txBody>
@@ -1473,37 +1473,37 @@
           <a:lstStyle>
             <a:lvl1pPr marL="0" indent="0">
               <a:buNone/>
-              <a:defRPr sz="1900" b="1"/>
+              <a:defRPr sz="2000" b="1"/>
             </a:lvl1pPr>
-            <a:lvl2pPr marL="360045" indent="0">
-              <a:buNone/>
-              <a:defRPr sz="1600" b="1"/>
+            <a:lvl2pPr marL="371674" indent="0">
+              <a:buNone/>
+              <a:defRPr sz="1700" b="1"/>
             </a:lvl2pPr>
-            <a:lvl3pPr marL="720090" indent="0">
+            <a:lvl3pPr marL="743349" indent="0">
               <a:buNone/>
               <a:defRPr sz="1400" b="1"/>
             </a:lvl3pPr>
-            <a:lvl4pPr marL="1080135" indent="0">
+            <a:lvl4pPr marL="1115023" indent="0">
               <a:buNone/>
               <a:defRPr sz="1300" b="1"/>
             </a:lvl4pPr>
-            <a:lvl5pPr marL="1440180" indent="0">
+            <a:lvl5pPr marL="1486698" indent="0">
               <a:buNone/>
               <a:defRPr sz="1300" b="1"/>
             </a:lvl5pPr>
-            <a:lvl6pPr marL="1800225" indent="0">
+            <a:lvl6pPr marL="1858372" indent="0">
               <a:buNone/>
               <a:defRPr sz="1300" b="1"/>
             </a:lvl6pPr>
-            <a:lvl7pPr marL="2160270" indent="0">
+            <a:lvl7pPr marL="2230047" indent="0">
               <a:buNone/>
               <a:defRPr sz="1300" b="1"/>
             </a:lvl7pPr>
-            <a:lvl8pPr marL="2520315" indent="0">
+            <a:lvl8pPr marL="2601721" indent="0">
               <a:buNone/>
               <a:defRPr sz="1300" b="1"/>
             </a:lvl8pPr>
-            <a:lvl9pPr marL="2880360" indent="0">
+            <a:lvl9pPr marL="2973396" indent="0">
               <a:buNone/>
               <a:defRPr sz="1300" b="1"/>
             </a:lvl9pPr>
@@ -1529,18 +1529,18 @@
         </p:nvSpPr>
         <p:spPr>
           <a:xfrm>
-            <a:off x="363617" y="1690060"/>
-            <a:ext cx="3213212" cy="3070480"/>
+            <a:off x="378063" y="2386324"/>
+            <a:ext cx="3340871" cy="4335441"/>
           </a:xfrm>
         </p:spPr>
         <p:txBody>
           <a:bodyPr/>
           <a:lstStyle>
             <a:lvl1pPr>
-              <a:defRPr sz="1900"/>
+              <a:defRPr sz="2000"/>
             </a:lvl1pPr>
             <a:lvl2pPr>
-              <a:defRPr sz="1600"/>
+              <a:defRPr sz="1700"/>
             </a:lvl2pPr>
             <a:lvl3pPr>
               <a:defRPr sz="1400"/>
@@ -1614,8 +1614,8 @@
         </p:nvSpPr>
         <p:spPr>
           <a:xfrm>
-            <a:off x="3694248" y="1192912"/>
-            <a:ext cx="3214475" cy="497150"/>
+            <a:off x="3841019" y="1684363"/>
+            <a:ext cx="3342184" cy="701964"/>
           </a:xfrm>
         </p:spPr>
         <p:txBody>
@@ -1623,37 +1623,37 @@
           <a:lstStyle>
             <a:lvl1pPr marL="0" indent="0">
               <a:buNone/>
-              <a:defRPr sz="1900" b="1"/>
+              <a:defRPr sz="2000" b="1"/>
             </a:lvl1pPr>
-            <a:lvl2pPr marL="360045" indent="0">
-              <a:buNone/>
-              <a:defRPr sz="1600" b="1"/>
+            <a:lvl2pPr marL="371674" indent="0">
+              <a:buNone/>
+              <a:defRPr sz="1700" b="1"/>
             </a:lvl2pPr>
-            <a:lvl3pPr marL="720090" indent="0">
+            <a:lvl3pPr marL="743349" indent="0">
               <a:buNone/>
               <a:defRPr sz="1400" b="1"/>
             </a:lvl3pPr>
-            <a:lvl4pPr marL="1080135" indent="0">
+            <a:lvl4pPr marL="1115023" indent="0">
               <a:buNone/>
               <a:defRPr sz="1300" b="1"/>
             </a:lvl4pPr>
-            <a:lvl5pPr marL="1440180" indent="0">
+            <a:lvl5pPr marL="1486698" indent="0">
               <a:buNone/>
               <a:defRPr sz="1300" b="1"/>
             </a:lvl5pPr>
-            <a:lvl6pPr marL="1800225" indent="0">
+            <a:lvl6pPr marL="1858372" indent="0">
               <a:buNone/>
               <a:defRPr sz="1300" b="1"/>
             </a:lvl6pPr>
-            <a:lvl7pPr marL="2160270" indent="0">
+            <a:lvl7pPr marL="2230047" indent="0">
               <a:buNone/>
               <a:defRPr sz="1300" b="1"/>
             </a:lvl7pPr>
-            <a:lvl8pPr marL="2520315" indent="0">
+            <a:lvl8pPr marL="2601721" indent="0">
               <a:buNone/>
               <a:defRPr sz="1300" b="1"/>
             </a:lvl8pPr>
-            <a:lvl9pPr marL="2880360" indent="0">
+            <a:lvl9pPr marL="2973396" indent="0">
               <a:buNone/>
               <a:defRPr sz="1300" b="1"/>
             </a:lvl9pPr>
@@ -1679,18 +1679,18 @@
         </p:nvSpPr>
         <p:spPr>
           <a:xfrm>
-            <a:off x="3694248" y="1690060"/>
-            <a:ext cx="3214475" cy="3070480"/>
+            <a:off x="3841019" y="2386324"/>
+            <a:ext cx="3342184" cy="4335441"/>
           </a:xfrm>
         </p:spPr>
         <p:txBody>
           <a:bodyPr/>
           <a:lstStyle>
             <a:lvl1pPr>
-              <a:defRPr sz="1900"/>
+              <a:defRPr sz="2000"/>
             </a:lvl1pPr>
             <a:lvl2pPr>
-              <a:defRPr sz="1600"/>
+              <a:defRPr sz="1700"/>
             </a:lvl2pPr>
             <a:lvl3pPr>
               <a:defRPr sz="1400"/>
@@ -1769,7 +1769,7 @@
           <a:p>
             <a:fld id="{0259FF92-1362-455E-ACBC-70B42DC48170}" type="datetimeFigureOut">
               <a:rPr lang="fr-FR" smtClean="0"/>
-              <a:t>12/07/2017</a:t>
+              <a:t>17/10/2017</a:t>
             </a:fld>
             <a:endParaRPr lang="fr-FR"/>
           </a:p>
@@ -1887,7 +1887,7 @@
           <a:p>
             <a:fld id="{0259FF92-1362-455E-ACBC-70B42DC48170}" type="datetimeFigureOut">
               <a:rPr lang="fr-FR" smtClean="0"/>
-              <a:t>12/07/2017</a:t>
+              <a:t>17/10/2017</a:t>
             </a:fld>
             <a:endParaRPr lang="fr-FR"/>
           </a:p>
@@ -1982,7 +1982,7 @@
           <a:p>
             <a:fld id="{0259FF92-1362-455E-ACBC-70B42DC48170}" type="datetimeFigureOut">
               <a:rPr lang="fr-FR" smtClean="0"/>
-              <a:t>12/07/2017</a:t>
+              <a:t>17/10/2017</a:t>
             </a:fld>
             <a:endParaRPr lang="fr-FR"/>
           </a:p>
@@ -2072,15 +2072,15 @@
         </p:nvSpPr>
         <p:spPr>
           <a:xfrm>
-            <a:off x="363620" y="212184"/>
-            <a:ext cx="2392549" cy="903009"/>
+            <a:off x="378073" y="299601"/>
+            <a:ext cx="2487603" cy="1275025"/>
           </a:xfrm>
         </p:spPr>
         <p:txBody>
           <a:bodyPr anchor="b"/>
           <a:lstStyle>
             <a:lvl1pPr algn="l">
-              <a:defRPr sz="1600" b="1"/>
+              <a:defRPr sz="1700" b="1"/>
             </a:lvl1pPr>
           </a:lstStyle>
           <a:p>
@@ -2104,39 +2104,39 @@
         </p:nvSpPr>
         <p:spPr>
           <a:xfrm>
-            <a:off x="2843285" y="212184"/>
-            <a:ext cx="4065439" cy="4548356"/>
+            <a:off x="2956248" y="299599"/>
+            <a:ext cx="4226956" cy="6422165"/>
           </a:xfrm>
         </p:spPr>
         <p:txBody>
           <a:bodyPr/>
           <a:lstStyle>
             <a:lvl1pPr>
-              <a:defRPr sz="2500"/>
+              <a:defRPr sz="2600"/>
             </a:lvl1pPr>
             <a:lvl2pPr>
-              <a:defRPr sz="2200"/>
+              <a:defRPr sz="2300"/>
             </a:lvl2pPr>
             <a:lvl3pPr>
-              <a:defRPr sz="1900"/>
+              <a:defRPr sz="2000"/>
             </a:lvl3pPr>
             <a:lvl4pPr>
-              <a:defRPr sz="1600"/>
+              <a:defRPr sz="1700"/>
             </a:lvl4pPr>
             <a:lvl5pPr>
-              <a:defRPr sz="1600"/>
+              <a:defRPr sz="1700"/>
             </a:lvl5pPr>
             <a:lvl6pPr>
-              <a:defRPr sz="1600"/>
+              <a:defRPr sz="1700"/>
             </a:lvl6pPr>
             <a:lvl7pPr>
-              <a:defRPr sz="1600"/>
+              <a:defRPr sz="1700"/>
             </a:lvl7pPr>
             <a:lvl8pPr>
-              <a:defRPr sz="1600"/>
+              <a:defRPr sz="1700"/>
             </a:lvl8pPr>
             <a:lvl9pPr>
-              <a:defRPr sz="1600"/>
+              <a:defRPr sz="1700"/>
             </a:lvl9pPr>
           </a:lstStyle>
           <a:p>
@@ -2189,8 +2189,8 @@
         </p:nvSpPr>
         <p:spPr>
           <a:xfrm>
-            <a:off x="363620" y="1115194"/>
-            <a:ext cx="2392549" cy="3645347"/>
+            <a:off x="378073" y="1574628"/>
+            <a:ext cx="2487603" cy="5147138"/>
           </a:xfrm>
         </p:spPr>
         <p:txBody>
@@ -2200,35 +2200,35 @@
               <a:buNone/>
               <a:defRPr sz="1100"/>
             </a:lvl1pPr>
-            <a:lvl2pPr marL="360045" indent="0">
+            <a:lvl2pPr marL="371674" indent="0">
               <a:buNone/>
               <a:defRPr sz="900"/>
             </a:lvl2pPr>
-            <a:lvl3pPr marL="720090" indent="0">
+            <a:lvl3pPr marL="743349" indent="0">
               <a:buNone/>
               <a:defRPr sz="800"/>
             </a:lvl3pPr>
-            <a:lvl4pPr marL="1080135" indent="0">
+            <a:lvl4pPr marL="1115023" indent="0">
               <a:buNone/>
               <a:defRPr sz="700"/>
             </a:lvl4pPr>
-            <a:lvl5pPr marL="1440180" indent="0">
+            <a:lvl5pPr marL="1486698" indent="0">
               <a:buNone/>
               <a:defRPr sz="700"/>
             </a:lvl5pPr>
-            <a:lvl6pPr marL="1800225" indent="0">
+            <a:lvl6pPr marL="1858372" indent="0">
               <a:buNone/>
               <a:defRPr sz="700"/>
             </a:lvl6pPr>
-            <a:lvl7pPr marL="2160270" indent="0">
+            <a:lvl7pPr marL="2230047" indent="0">
               <a:buNone/>
               <a:defRPr sz="700"/>
             </a:lvl7pPr>
-            <a:lvl8pPr marL="2520315" indent="0">
+            <a:lvl8pPr marL="2601721" indent="0">
               <a:buNone/>
               <a:defRPr sz="700"/>
             </a:lvl8pPr>
-            <a:lvl9pPr marL="2880360" indent="0">
+            <a:lvl9pPr marL="2973396" indent="0">
               <a:buNone/>
               <a:defRPr sz="700"/>
             </a:lvl9pPr>
@@ -2259,7 +2259,7 @@
           <a:p>
             <a:fld id="{0259FF92-1362-455E-ACBC-70B42DC48170}" type="datetimeFigureOut">
               <a:rPr lang="fr-FR" smtClean="0"/>
-              <a:t>12/07/2017</a:t>
+              <a:t>17/10/2017</a:t>
             </a:fld>
             <a:endParaRPr lang="fr-FR"/>
           </a:p>
@@ -2349,15 +2349,15 @@
         </p:nvSpPr>
         <p:spPr>
           <a:xfrm>
-            <a:off x="1425431" y="3730467"/>
-            <a:ext cx="4363403" cy="440403"/>
+            <a:off x="1482064" y="5267328"/>
+            <a:ext cx="4536758" cy="621838"/>
           </a:xfrm>
         </p:spPr>
         <p:txBody>
           <a:bodyPr anchor="b"/>
           <a:lstStyle>
             <a:lvl1pPr algn="l">
-              <a:defRPr sz="1600" b="1"/>
+              <a:defRPr sz="1700" b="1"/>
             </a:lvl1pPr>
           </a:lstStyle>
           <a:p>
@@ -2381,8 +2381,8 @@
         </p:nvSpPr>
         <p:spPr>
           <a:xfrm>
-            <a:off x="1425431" y="476178"/>
-            <a:ext cx="4363403" cy="3197543"/>
+            <a:off x="1482064" y="672354"/>
+            <a:ext cx="4536758" cy="4514850"/>
           </a:xfrm>
         </p:spPr>
         <p:txBody>
@@ -2390,39 +2390,39 @@
           <a:lstStyle>
             <a:lvl1pPr marL="0" indent="0">
               <a:buNone/>
-              <a:defRPr sz="2500"/>
+              <a:defRPr sz="2600"/>
             </a:lvl1pPr>
-            <a:lvl2pPr marL="360045" indent="0">
-              <a:buNone/>
-              <a:defRPr sz="2200"/>
+            <a:lvl2pPr marL="371674" indent="0">
+              <a:buNone/>
+              <a:defRPr sz="2300"/>
             </a:lvl2pPr>
-            <a:lvl3pPr marL="720090" indent="0">
-              <a:buNone/>
-              <a:defRPr sz="1900"/>
+            <a:lvl3pPr marL="743349" indent="0">
+              <a:buNone/>
+              <a:defRPr sz="2000"/>
             </a:lvl3pPr>
-            <a:lvl4pPr marL="1080135" indent="0">
-              <a:buNone/>
-              <a:defRPr sz="1600"/>
+            <a:lvl4pPr marL="1115023" indent="0">
+              <a:buNone/>
+              <a:defRPr sz="1700"/>
             </a:lvl4pPr>
-            <a:lvl5pPr marL="1440180" indent="0">
-              <a:buNone/>
-              <a:defRPr sz="1600"/>
+            <a:lvl5pPr marL="1486698" indent="0">
+              <a:buNone/>
+              <a:defRPr sz="1700"/>
             </a:lvl5pPr>
-            <a:lvl6pPr marL="1800225" indent="0">
-              <a:buNone/>
-              <a:defRPr sz="1600"/>
+            <a:lvl6pPr marL="1858372" indent="0">
+              <a:buNone/>
+              <a:defRPr sz="1700"/>
             </a:lvl6pPr>
-            <a:lvl7pPr marL="2160270" indent="0">
-              <a:buNone/>
-              <a:defRPr sz="1600"/>
+            <a:lvl7pPr marL="2230047" indent="0">
+              <a:buNone/>
+              <a:defRPr sz="1700"/>
             </a:lvl7pPr>
-            <a:lvl8pPr marL="2520315" indent="0">
-              <a:buNone/>
-              <a:defRPr sz="1600"/>
+            <a:lvl8pPr marL="2601721" indent="0">
+              <a:buNone/>
+              <a:defRPr sz="1700"/>
             </a:lvl8pPr>
-            <a:lvl9pPr marL="2880360" indent="0">
-              <a:buNone/>
-              <a:defRPr sz="1600"/>
+            <a:lvl9pPr marL="2973396" indent="0">
+              <a:buNone/>
+              <a:defRPr sz="1700"/>
             </a:lvl9pPr>
           </a:lstStyle>
           <a:p>
@@ -2442,8 +2442,8 @@
         </p:nvSpPr>
         <p:spPr>
           <a:xfrm>
-            <a:off x="1425431" y="4170870"/>
-            <a:ext cx="4363403" cy="625446"/>
+            <a:off x="1482064" y="5889166"/>
+            <a:ext cx="4536758" cy="883115"/>
           </a:xfrm>
         </p:spPr>
         <p:txBody>
@@ -2453,35 +2453,35 @@
               <a:buNone/>
               <a:defRPr sz="1100"/>
             </a:lvl1pPr>
-            <a:lvl2pPr marL="360045" indent="0">
+            <a:lvl2pPr marL="371674" indent="0">
               <a:buNone/>
               <a:defRPr sz="900"/>
             </a:lvl2pPr>
-            <a:lvl3pPr marL="720090" indent="0">
+            <a:lvl3pPr marL="743349" indent="0">
               <a:buNone/>
               <a:defRPr sz="800"/>
             </a:lvl3pPr>
-            <a:lvl4pPr marL="1080135" indent="0">
+            <a:lvl4pPr marL="1115023" indent="0">
               <a:buNone/>
               <a:defRPr sz="700"/>
             </a:lvl4pPr>
-            <a:lvl5pPr marL="1440180" indent="0">
+            <a:lvl5pPr marL="1486698" indent="0">
               <a:buNone/>
               <a:defRPr sz="700"/>
             </a:lvl5pPr>
-            <a:lvl6pPr marL="1800225" indent="0">
+            <a:lvl6pPr marL="1858372" indent="0">
               <a:buNone/>
               <a:defRPr sz="700"/>
             </a:lvl6pPr>
-            <a:lvl7pPr marL="2160270" indent="0">
+            <a:lvl7pPr marL="2230047" indent="0">
               <a:buNone/>
               <a:defRPr sz="700"/>
             </a:lvl7pPr>
-            <a:lvl8pPr marL="2520315" indent="0">
+            <a:lvl8pPr marL="2601721" indent="0">
               <a:buNone/>
               <a:defRPr sz="700"/>
             </a:lvl8pPr>
-            <a:lvl9pPr marL="2880360" indent="0">
+            <a:lvl9pPr marL="2973396" indent="0">
               <a:buNone/>
               <a:defRPr sz="700"/>
             </a:lvl9pPr>
@@ -2512,7 +2512,7 @@
           <a:p>
             <a:fld id="{0259FF92-1362-455E-ACBC-70B42DC48170}" type="datetimeFigureOut">
               <a:rPr lang="fr-FR" smtClean="0"/>
-              <a:t>12/07/2017</a:t>
+              <a:t>17/10/2017</a:t>
             </a:fld>
             <a:endParaRPr lang="fr-FR"/>
           </a:p>
@@ -2607,15 +2607,15 @@
         </p:nvSpPr>
         <p:spPr>
           <a:xfrm>
-            <a:off x="363617" y="213418"/>
-            <a:ext cx="6545104" cy="888207"/>
+            <a:off x="378064" y="301345"/>
+            <a:ext cx="6805136" cy="1254125"/>
           </a:xfrm>
           <a:prstGeom prst="rect">
             <a:avLst/>
           </a:prstGeom>
         </p:spPr>
         <p:txBody>
-          <a:bodyPr vert="horz" lIns="72009" tIns="36005" rIns="72009" bIns="36005" rtlCol="0" anchor="ctr">
+          <a:bodyPr vert="horz" lIns="74335" tIns="37168" rIns="74335" bIns="37168" rtlCol="0" anchor="ctr">
             <a:normAutofit/>
           </a:bodyPr>
           <a:lstStyle/>
@@ -2640,15 +2640,15 @@
         </p:nvSpPr>
         <p:spPr>
           <a:xfrm>
-            <a:off x="363617" y="1243491"/>
-            <a:ext cx="6545104" cy="3517051"/>
+            <a:off x="378064" y="1755781"/>
+            <a:ext cx="6805136" cy="4965987"/>
           </a:xfrm>
           <a:prstGeom prst="rect">
             <a:avLst/>
           </a:prstGeom>
         </p:spPr>
         <p:txBody>
-          <a:bodyPr vert="horz" lIns="72009" tIns="36005" rIns="72009" bIns="36005" rtlCol="0">
+          <a:bodyPr vert="horz" lIns="74335" tIns="37168" rIns="74335" bIns="37168" rtlCol="0">
             <a:normAutofit/>
           </a:bodyPr>
           <a:lstStyle/>
@@ -2702,15 +2702,15 @@
         </p:nvSpPr>
         <p:spPr>
           <a:xfrm>
-            <a:off x="363619" y="4939416"/>
-            <a:ext cx="1696879" cy="283732"/>
+            <a:off x="378072" y="6974332"/>
+            <a:ext cx="1764295" cy="400623"/>
           </a:xfrm>
           <a:prstGeom prst="rect">
             <a:avLst/>
           </a:prstGeom>
         </p:spPr>
         <p:txBody>
-          <a:bodyPr vert="horz" lIns="72009" tIns="36005" rIns="72009" bIns="36005" rtlCol="0" anchor="ctr"/>
+          <a:bodyPr vert="horz" lIns="74335" tIns="37168" rIns="74335" bIns="37168" rtlCol="0" anchor="ctr"/>
           <a:lstStyle>
             <a:lvl1pPr algn="l">
               <a:defRPr sz="900">
@@ -2725,7 +2725,7 @@
           <a:p>
             <a:fld id="{0259FF92-1362-455E-ACBC-70B42DC48170}" type="datetimeFigureOut">
               <a:rPr lang="fr-FR" smtClean="0"/>
-              <a:t>12/07/2017</a:t>
+              <a:t>17/10/2017</a:t>
             </a:fld>
             <a:endParaRPr lang="fr-FR"/>
           </a:p>
@@ -2743,15 +2743,15 @@
         </p:nvSpPr>
         <p:spPr>
           <a:xfrm>
-            <a:off x="2484717" y="4939416"/>
-            <a:ext cx="2302907" cy="283732"/>
+            <a:off x="2583434" y="6974332"/>
+            <a:ext cx="2394400" cy="400623"/>
           </a:xfrm>
           <a:prstGeom prst="rect">
             <a:avLst/>
           </a:prstGeom>
         </p:spPr>
         <p:txBody>
-          <a:bodyPr vert="horz" lIns="72009" tIns="36005" rIns="72009" bIns="36005" rtlCol="0" anchor="ctr"/>
+          <a:bodyPr vert="horz" lIns="74335" tIns="37168" rIns="74335" bIns="37168" rtlCol="0" anchor="ctr"/>
           <a:lstStyle>
             <a:lvl1pPr algn="ctr">
               <a:defRPr sz="900">
@@ -2780,15 +2780,15 @@
         </p:nvSpPr>
         <p:spPr>
           <a:xfrm>
-            <a:off x="5211844" y="4939416"/>
-            <a:ext cx="1696879" cy="283732"/>
+            <a:off x="5418913" y="6974332"/>
+            <a:ext cx="1764295" cy="400623"/>
           </a:xfrm>
           <a:prstGeom prst="rect">
             <a:avLst/>
           </a:prstGeom>
         </p:spPr>
         <p:txBody>
-          <a:bodyPr vert="horz" lIns="72009" tIns="36005" rIns="72009" bIns="36005" rtlCol="0" anchor="ctr"/>
+          <a:bodyPr vert="horz" lIns="74335" tIns="37168" rIns="74335" bIns="37168" rtlCol="0" anchor="ctr"/>
           <a:lstStyle>
             <a:lvl1pPr algn="r">
               <a:defRPr sz="900">
@@ -2832,12 +2832,12 @@
   </p:sldLayoutIdLst>
   <p:txStyles>
     <p:titleStyle>
-      <a:lvl1pPr algn="ctr" defTabSz="720090" rtl="0" eaLnBrk="1" latinLnBrk="0" hangingPunct="1">
+      <a:lvl1pPr algn="ctr" defTabSz="743349" rtl="0" eaLnBrk="1" latinLnBrk="0" hangingPunct="1">
         <a:spcBef>
           <a:spcPct val="0"/>
         </a:spcBef>
         <a:buNone/>
-        <a:defRPr sz="3500" kern="1200">
+        <a:defRPr sz="3600" kern="1200">
           <a:solidFill>
             <a:schemeClr val="tx1"/>
           </a:solidFill>
@@ -2848,13 +2848,13 @@
       </a:lvl1pPr>
     </p:titleStyle>
     <p:bodyStyle>
-      <a:lvl1pPr marL="270034" indent="-270034" algn="l" defTabSz="720090" rtl="0" eaLnBrk="1" latinLnBrk="0" hangingPunct="1">
+      <a:lvl1pPr marL="278756" indent="-278756" algn="l" defTabSz="743349" rtl="0" eaLnBrk="1" latinLnBrk="0" hangingPunct="1">
         <a:spcBef>
           <a:spcPct val="20000"/>
         </a:spcBef>
         <a:buFont typeface="Arial" panose="020B0604020202020204" pitchFamily="34" charset="0"/>
         <a:buChar char="•"/>
-        <a:defRPr sz="2500" kern="1200">
+        <a:defRPr sz="2600" kern="1200">
           <a:solidFill>
             <a:schemeClr val="tx1"/>
           </a:solidFill>
@@ -2863,13 +2863,13 @@
           <a:cs typeface="+mn-cs"/>
         </a:defRPr>
       </a:lvl1pPr>
-      <a:lvl2pPr marL="585073" indent="-225028" algn="l" defTabSz="720090" rtl="0" eaLnBrk="1" latinLnBrk="0" hangingPunct="1">
+      <a:lvl2pPr marL="603971" indent="-232296" algn="l" defTabSz="743349" rtl="0" eaLnBrk="1" latinLnBrk="0" hangingPunct="1">
         <a:spcBef>
           <a:spcPct val="20000"/>
         </a:spcBef>
         <a:buFont typeface="Arial" panose="020B0604020202020204" pitchFamily="34" charset="0"/>
         <a:buChar char="–"/>
-        <a:defRPr sz="2200" kern="1200">
+        <a:defRPr sz="2300" kern="1200">
           <a:solidFill>
             <a:schemeClr val="tx1"/>
           </a:solidFill>
@@ -2878,13 +2878,13 @@
           <a:cs typeface="+mn-cs"/>
         </a:defRPr>
       </a:lvl2pPr>
-      <a:lvl3pPr marL="900113" indent="-180023" algn="l" defTabSz="720090" rtl="0" eaLnBrk="1" latinLnBrk="0" hangingPunct="1">
+      <a:lvl3pPr marL="929187" indent="-185838" algn="l" defTabSz="743349" rtl="0" eaLnBrk="1" latinLnBrk="0" hangingPunct="1">
         <a:spcBef>
           <a:spcPct val="20000"/>
         </a:spcBef>
         <a:buFont typeface="Arial" panose="020B0604020202020204" pitchFamily="34" charset="0"/>
         <a:buChar char="•"/>
-        <a:defRPr sz="1900" kern="1200">
+        <a:defRPr sz="2000" kern="1200">
           <a:solidFill>
             <a:schemeClr val="tx1"/>
           </a:solidFill>
@@ -2893,13 +2893,13 @@
           <a:cs typeface="+mn-cs"/>
         </a:defRPr>
       </a:lvl3pPr>
-      <a:lvl4pPr marL="1260158" indent="-180023" algn="l" defTabSz="720090" rtl="0" eaLnBrk="1" latinLnBrk="0" hangingPunct="1">
+      <a:lvl4pPr marL="1300861" indent="-185838" algn="l" defTabSz="743349" rtl="0" eaLnBrk="1" latinLnBrk="0" hangingPunct="1">
         <a:spcBef>
           <a:spcPct val="20000"/>
         </a:spcBef>
         <a:buFont typeface="Arial" panose="020B0604020202020204" pitchFamily="34" charset="0"/>
         <a:buChar char="–"/>
-        <a:defRPr sz="1600" kern="1200">
+        <a:defRPr sz="1700" kern="1200">
           <a:solidFill>
             <a:schemeClr val="tx1"/>
           </a:solidFill>
@@ -2908,13 +2908,13 @@
           <a:cs typeface="+mn-cs"/>
         </a:defRPr>
       </a:lvl4pPr>
-      <a:lvl5pPr marL="1620203" indent="-180023" algn="l" defTabSz="720090" rtl="0" eaLnBrk="1" latinLnBrk="0" hangingPunct="1">
+      <a:lvl5pPr marL="1672536" indent="-185838" algn="l" defTabSz="743349" rtl="0" eaLnBrk="1" latinLnBrk="0" hangingPunct="1">
         <a:spcBef>
           <a:spcPct val="20000"/>
         </a:spcBef>
         <a:buFont typeface="Arial" panose="020B0604020202020204" pitchFamily="34" charset="0"/>
         <a:buChar char="»"/>
-        <a:defRPr sz="1600" kern="1200">
+        <a:defRPr sz="1700" kern="1200">
           <a:solidFill>
             <a:schemeClr val="tx1"/>
           </a:solidFill>
@@ -2923,13 +2923,13 @@
           <a:cs typeface="+mn-cs"/>
         </a:defRPr>
       </a:lvl5pPr>
-      <a:lvl6pPr marL="1980248" indent="-180023" algn="l" defTabSz="720090" rtl="0" eaLnBrk="1" latinLnBrk="0" hangingPunct="1">
+      <a:lvl6pPr marL="2044210" indent="-185838" algn="l" defTabSz="743349" rtl="0" eaLnBrk="1" latinLnBrk="0" hangingPunct="1">
         <a:spcBef>
           <a:spcPct val="20000"/>
         </a:spcBef>
         <a:buFont typeface="Arial" panose="020B0604020202020204" pitchFamily="34" charset="0"/>
         <a:buChar char="•"/>
-        <a:defRPr sz="1600" kern="1200">
+        <a:defRPr sz="1700" kern="1200">
           <a:solidFill>
             <a:schemeClr val="tx1"/>
           </a:solidFill>
@@ -2938,13 +2938,13 @@
           <a:cs typeface="+mn-cs"/>
         </a:defRPr>
       </a:lvl6pPr>
-      <a:lvl7pPr marL="2340293" indent="-180023" algn="l" defTabSz="720090" rtl="0" eaLnBrk="1" latinLnBrk="0" hangingPunct="1">
+      <a:lvl7pPr marL="2415884" indent="-185838" algn="l" defTabSz="743349" rtl="0" eaLnBrk="1" latinLnBrk="0" hangingPunct="1">
         <a:spcBef>
           <a:spcPct val="20000"/>
         </a:spcBef>
         <a:buFont typeface="Arial" panose="020B0604020202020204" pitchFamily="34" charset="0"/>
         <a:buChar char="•"/>
-        <a:defRPr sz="1600" kern="1200">
+        <a:defRPr sz="1700" kern="1200">
           <a:solidFill>
             <a:schemeClr val="tx1"/>
           </a:solidFill>
@@ -2953,13 +2953,13 @@
           <a:cs typeface="+mn-cs"/>
         </a:defRPr>
       </a:lvl7pPr>
-      <a:lvl8pPr marL="2700338" indent="-180023" algn="l" defTabSz="720090" rtl="0" eaLnBrk="1" latinLnBrk="0" hangingPunct="1">
+      <a:lvl8pPr marL="2787559" indent="-185838" algn="l" defTabSz="743349" rtl="0" eaLnBrk="1" latinLnBrk="0" hangingPunct="1">
         <a:spcBef>
           <a:spcPct val="20000"/>
         </a:spcBef>
         <a:buFont typeface="Arial" panose="020B0604020202020204" pitchFamily="34" charset="0"/>
         <a:buChar char="•"/>
-        <a:defRPr sz="1600" kern="1200">
+        <a:defRPr sz="1700" kern="1200">
           <a:solidFill>
             <a:schemeClr val="tx1"/>
           </a:solidFill>
@@ -2968,13 +2968,13 @@
           <a:cs typeface="+mn-cs"/>
         </a:defRPr>
       </a:lvl8pPr>
-      <a:lvl9pPr marL="3060383" indent="-180023" algn="l" defTabSz="720090" rtl="0" eaLnBrk="1" latinLnBrk="0" hangingPunct="1">
+      <a:lvl9pPr marL="3159233" indent="-185838" algn="l" defTabSz="743349" rtl="0" eaLnBrk="1" latinLnBrk="0" hangingPunct="1">
         <a:spcBef>
           <a:spcPct val="20000"/>
         </a:spcBef>
         <a:buFont typeface="Arial" panose="020B0604020202020204" pitchFamily="34" charset="0"/>
         <a:buChar char="•"/>
-        <a:defRPr sz="1600" kern="1200">
+        <a:defRPr sz="1700" kern="1200">
           <a:solidFill>
             <a:schemeClr val="tx1"/>
           </a:solidFill>
@@ -2988,7 +2988,7 @@
       <a:defPPr>
         <a:defRPr lang="fr-FR"/>
       </a:defPPr>
-      <a:lvl1pPr marL="0" algn="l" defTabSz="720090" rtl="0" eaLnBrk="1" latinLnBrk="0" hangingPunct="1">
+      <a:lvl1pPr marL="0" algn="l" defTabSz="743349" rtl="0" eaLnBrk="1" latinLnBrk="0" hangingPunct="1">
         <a:defRPr sz="1400" kern="1200">
           <a:solidFill>
             <a:schemeClr val="tx1"/>
@@ -2998,7 +2998,7 @@
           <a:cs typeface="+mn-cs"/>
         </a:defRPr>
       </a:lvl1pPr>
-      <a:lvl2pPr marL="360045" algn="l" defTabSz="720090" rtl="0" eaLnBrk="1" latinLnBrk="0" hangingPunct="1">
+      <a:lvl2pPr marL="371674" algn="l" defTabSz="743349" rtl="0" eaLnBrk="1" latinLnBrk="0" hangingPunct="1">
         <a:defRPr sz="1400" kern="1200">
           <a:solidFill>
             <a:schemeClr val="tx1"/>
@@ -3008,7 +3008,7 @@
           <a:cs typeface="+mn-cs"/>
         </a:defRPr>
       </a:lvl2pPr>
-      <a:lvl3pPr marL="720090" algn="l" defTabSz="720090" rtl="0" eaLnBrk="1" latinLnBrk="0" hangingPunct="1">
+      <a:lvl3pPr marL="743349" algn="l" defTabSz="743349" rtl="0" eaLnBrk="1" latinLnBrk="0" hangingPunct="1">
         <a:defRPr sz="1400" kern="1200">
           <a:solidFill>
             <a:schemeClr val="tx1"/>
@@ -3018,7 +3018,7 @@
           <a:cs typeface="+mn-cs"/>
         </a:defRPr>
       </a:lvl3pPr>
-      <a:lvl4pPr marL="1080135" algn="l" defTabSz="720090" rtl="0" eaLnBrk="1" latinLnBrk="0" hangingPunct="1">
+      <a:lvl4pPr marL="1115023" algn="l" defTabSz="743349" rtl="0" eaLnBrk="1" latinLnBrk="0" hangingPunct="1">
         <a:defRPr sz="1400" kern="1200">
           <a:solidFill>
             <a:schemeClr val="tx1"/>
@@ -3028,7 +3028,7 @@
           <a:cs typeface="+mn-cs"/>
         </a:defRPr>
       </a:lvl4pPr>
-      <a:lvl5pPr marL="1440180" algn="l" defTabSz="720090" rtl="0" eaLnBrk="1" latinLnBrk="0" hangingPunct="1">
+      <a:lvl5pPr marL="1486698" algn="l" defTabSz="743349" rtl="0" eaLnBrk="1" latinLnBrk="0" hangingPunct="1">
         <a:defRPr sz="1400" kern="1200">
           <a:solidFill>
             <a:schemeClr val="tx1"/>
@@ -3038,7 +3038,7 @@
           <a:cs typeface="+mn-cs"/>
         </a:defRPr>
       </a:lvl5pPr>
-      <a:lvl6pPr marL="1800225" algn="l" defTabSz="720090" rtl="0" eaLnBrk="1" latinLnBrk="0" hangingPunct="1">
+      <a:lvl6pPr marL="1858372" algn="l" defTabSz="743349" rtl="0" eaLnBrk="1" latinLnBrk="0" hangingPunct="1">
         <a:defRPr sz="1400" kern="1200">
           <a:solidFill>
             <a:schemeClr val="tx1"/>
@@ -3048,7 +3048,7 @@
           <a:cs typeface="+mn-cs"/>
         </a:defRPr>
       </a:lvl6pPr>
-      <a:lvl7pPr marL="2160270" algn="l" defTabSz="720090" rtl="0" eaLnBrk="1" latinLnBrk="0" hangingPunct="1">
+      <a:lvl7pPr marL="2230047" algn="l" defTabSz="743349" rtl="0" eaLnBrk="1" latinLnBrk="0" hangingPunct="1">
         <a:defRPr sz="1400" kern="1200">
           <a:solidFill>
             <a:schemeClr val="tx1"/>
@@ -3058,7 +3058,7 @@
           <a:cs typeface="+mn-cs"/>
         </a:defRPr>
       </a:lvl7pPr>
-      <a:lvl8pPr marL="2520315" algn="l" defTabSz="720090" rtl="0" eaLnBrk="1" latinLnBrk="0" hangingPunct="1">
+      <a:lvl8pPr marL="2601721" algn="l" defTabSz="743349" rtl="0" eaLnBrk="1" latinLnBrk="0" hangingPunct="1">
         <a:defRPr sz="1400" kern="1200">
           <a:solidFill>
             <a:schemeClr val="tx1"/>
@@ -3068,7 +3068,7 @@
           <a:cs typeface="+mn-cs"/>
         </a:defRPr>
       </a:lvl8pPr>
-      <a:lvl9pPr marL="2880360" algn="l" defTabSz="720090" rtl="0" eaLnBrk="1" latinLnBrk="0" hangingPunct="1">
+      <a:lvl9pPr marL="2973396" algn="l" defTabSz="743349" rtl="0" eaLnBrk="1" latinLnBrk="0" hangingPunct="1">
         <a:defRPr sz="1400" kern="1200">
           <a:solidFill>
             <a:schemeClr val="tx1"/>
@@ -3102,7 +3102,7 @@
       </p:grpSpPr>
       <p:pic>
         <p:nvPicPr>
-          <p:cNvPr id="8" name="Picture 2"/>
+          <p:cNvPr id="25" name="Picture 2"/>
           <p:cNvPicPr>
             <a:picLocks noChangeAspect="1" noChangeArrowheads="1"/>
           </p:cNvPicPr>
@@ -3123,8 +3123,8 @@
         </p:blipFill>
         <p:spPr bwMode="auto">
           <a:xfrm>
-            <a:off x="-180528" y="-99392"/>
-            <a:ext cx="7712075" cy="5548313"/>
+            <a:off x="-288000" y="-180000"/>
+            <a:ext cx="8193088" cy="7816850"/>
           </a:xfrm>
           <a:prstGeom prst="rect">
             <a:avLst/>
@@ -3154,6 +3154,339 @@
           </a:extLst>
         </p:spPr>
       </p:pic>
+      <p:sp>
+        <p:nvSpPr>
+          <p:cNvPr id="2" name="Rectangle 1"/>
+          <p:cNvSpPr/>
+          <p:nvPr/>
+        </p:nvSpPr>
+        <p:spPr>
+          <a:xfrm>
+            <a:off x="972319" y="3474343"/>
+            <a:ext cx="288032" cy="504056"/>
+          </a:xfrm>
+          <a:prstGeom prst="rect">
+            <a:avLst/>
+          </a:prstGeom>
+          <a:noFill/>
+        </p:spPr>
+        <p:style>
+          <a:lnRef idx="2">
+            <a:schemeClr val="accent1">
+              <a:shade val="50000"/>
+            </a:schemeClr>
+          </a:lnRef>
+          <a:fillRef idx="1">
+            <a:schemeClr val="accent1"/>
+          </a:fillRef>
+          <a:effectRef idx="0">
+            <a:schemeClr val="accent1"/>
+          </a:effectRef>
+          <a:fontRef idx="minor">
+            <a:schemeClr val="lt1"/>
+          </a:fontRef>
+        </p:style>
+        <p:txBody>
+          <a:bodyPr rtlCol="0" anchor="ctr"/>
+          <a:lstStyle/>
+          <a:p>
+            <a:pPr algn="ctr"/>
+            <a:endParaRPr lang="fr-FR"/>
+          </a:p>
+        </p:txBody>
+      </p:sp>
+      <p:cxnSp>
+        <p:nvCxnSpPr>
+          <p:cNvPr id="4" name="Connecteur droit 3"/>
+          <p:cNvCxnSpPr/>
+          <p:nvPr/>
+        </p:nvCxnSpPr>
+        <p:spPr>
+          <a:xfrm flipH="1">
+            <a:off x="580566" y="3978399"/>
+            <a:ext cx="391753" cy="1440160"/>
+          </a:xfrm>
+          <a:prstGeom prst="line">
+            <a:avLst/>
+          </a:prstGeom>
+          <a:ln w="19050">
+            <a:solidFill>
+              <a:schemeClr val="tx2"/>
+            </a:solidFill>
+          </a:ln>
+        </p:spPr>
+        <p:style>
+          <a:lnRef idx="1">
+            <a:schemeClr val="accent1"/>
+          </a:lnRef>
+          <a:fillRef idx="0">
+            <a:schemeClr val="accent1"/>
+          </a:fillRef>
+          <a:effectRef idx="0">
+            <a:schemeClr val="accent1"/>
+          </a:effectRef>
+          <a:fontRef idx="minor">
+            <a:schemeClr val="tx1"/>
+          </a:fontRef>
+        </p:style>
+      </p:cxnSp>
+      <p:cxnSp>
+        <p:nvCxnSpPr>
+          <p:cNvPr id="7" name="Connecteur droit 6"/>
+          <p:cNvCxnSpPr/>
+          <p:nvPr/>
+        </p:nvCxnSpPr>
+        <p:spPr>
+          <a:xfrm>
+            <a:off x="1260351" y="3978399"/>
+            <a:ext cx="1080120" cy="1440160"/>
+          </a:xfrm>
+          <a:prstGeom prst="line">
+            <a:avLst/>
+          </a:prstGeom>
+          <a:ln w="19050">
+            <a:solidFill>
+              <a:schemeClr val="tx2"/>
+            </a:solidFill>
+          </a:ln>
+        </p:spPr>
+        <p:style>
+          <a:lnRef idx="1">
+            <a:schemeClr val="accent1"/>
+          </a:lnRef>
+          <a:fillRef idx="0">
+            <a:schemeClr val="accent1"/>
+          </a:fillRef>
+          <a:effectRef idx="0">
+            <a:schemeClr val="accent1"/>
+          </a:effectRef>
+          <a:fontRef idx="minor">
+            <a:schemeClr val="tx1"/>
+          </a:fontRef>
+        </p:style>
+      </p:cxnSp>
+      <p:sp>
+        <p:nvSpPr>
+          <p:cNvPr id="14" name="Rectangle 13"/>
+          <p:cNvSpPr/>
+          <p:nvPr/>
+        </p:nvSpPr>
+        <p:spPr>
+          <a:xfrm>
+            <a:off x="5076775" y="3474343"/>
+            <a:ext cx="288032" cy="504056"/>
+          </a:xfrm>
+          <a:prstGeom prst="rect">
+            <a:avLst/>
+          </a:prstGeom>
+          <a:noFill/>
+        </p:spPr>
+        <p:style>
+          <a:lnRef idx="2">
+            <a:schemeClr val="accent1">
+              <a:shade val="50000"/>
+            </a:schemeClr>
+          </a:lnRef>
+          <a:fillRef idx="1">
+            <a:schemeClr val="accent1"/>
+          </a:fillRef>
+          <a:effectRef idx="0">
+            <a:schemeClr val="accent1"/>
+          </a:effectRef>
+          <a:fontRef idx="minor">
+            <a:schemeClr val="lt1"/>
+          </a:fontRef>
+        </p:style>
+        <p:txBody>
+          <a:bodyPr rtlCol="0" anchor="ctr"/>
+          <a:lstStyle/>
+          <a:p>
+            <a:pPr algn="ctr"/>
+            <a:endParaRPr lang="fr-FR"/>
+          </a:p>
+        </p:txBody>
+      </p:sp>
+      <p:cxnSp>
+        <p:nvCxnSpPr>
+          <p:cNvPr id="15" name="Connecteur droit 14"/>
+          <p:cNvCxnSpPr/>
+          <p:nvPr/>
+        </p:nvCxnSpPr>
+        <p:spPr>
+          <a:xfrm flipH="1">
+            <a:off x="3178800" y="3978399"/>
+            <a:ext cx="1897975" cy="1440160"/>
+          </a:xfrm>
+          <a:prstGeom prst="line">
+            <a:avLst/>
+          </a:prstGeom>
+          <a:ln w="19050">
+            <a:solidFill>
+              <a:schemeClr val="tx2"/>
+            </a:solidFill>
+          </a:ln>
+        </p:spPr>
+        <p:style>
+          <a:lnRef idx="1">
+            <a:schemeClr val="accent1"/>
+          </a:lnRef>
+          <a:fillRef idx="0">
+            <a:schemeClr val="accent1"/>
+          </a:fillRef>
+          <a:effectRef idx="0">
+            <a:schemeClr val="accent1"/>
+          </a:effectRef>
+          <a:fontRef idx="minor">
+            <a:schemeClr val="tx1"/>
+          </a:fontRef>
+        </p:style>
+      </p:cxnSp>
+      <p:cxnSp>
+        <p:nvCxnSpPr>
+          <p:cNvPr id="20" name="Connecteur droit 19"/>
+          <p:cNvCxnSpPr/>
+          <p:nvPr/>
+        </p:nvCxnSpPr>
+        <p:spPr>
+          <a:xfrm flipH="1">
+            <a:off x="4932759" y="3978399"/>
+            <a:ext cx="432050" cy="1440160"/>
+          </a:xfrm>
+          <a:prstGeom prst="line">
+            <a:avLst/>
+          </a:prstGeom>
+          <a:ln w="19050">
+            <a:solidFill>
+              <a:schemeClr val="tx2"/>
+            </a:solidFill>
+          </a:ln>
+        </p:spPr>
+        <p:style>
+          <a:lnRef idx="1">
+            <a:schemeClr val="accent1"/>
+          </a:lnRef>
+          <a:fillRef idx="0">
+            <a:schemeClr val="accent1"/>
+          </a:fillRef>
+          <a:effectRef idx="0">
+            <a:schemeClr val="accent1"/>
+          </a:effectRef>
+          <a:fontRef idx="minor">
+            <a:schemeClr val="tx1"/>
+          </a:fontRef>
+        </p:style>
+      </p:cxnSp>
+      <p:cxnSp>
+        <p:nvCxnSpPr>
+          <p:cNvPr id="26" name="Connecteur droit 25"/>
+          <p:cNvCxnSpPr/>
+          <p:nvPr/>
+        </p:nvCxnSpPr>
+        <p:spPr>
+          <a:xfrm flipH="1">
+            <a:off x="5781600" y="4122416"/>
+            <a:ext cx="626403" cy="1296143"/>
+          </a:xfrm>
+          <a:prstGeom prst="line">
+            <a:avLst/>
+          </a:prstGeom>
+          <a:ln w="19050">
+            <a:solidFill>
+              <a:schemeClr val="tx2"/>
+            </a:solidFill>
+          </a:ln>
+        </p:spPr>
+        <p:style>
+          <a:lnRef idx="1">
+            <a:schemeClr val="accent1"/>
+          </a:lnRef>
+          <a:fillRef idx="0">
+            <a:schemeClr val="accent1"/>
+          </a:fillRef>
+          <a:effectRef idx="0">
+            <a:schemeClr val="accent1"/>
+          </a:effectRef>
+          <a:fontRef idx="minor">
+            <a:schemeClr val="tx1"/>
+          </a:fontRef>
+        </p:style>
+      </p:cxnSp>
+      <p:sp>
+        <p:nvSpPr>
+          <p:cNvPr id="28" name="Rectangle 27"/>
+          <p:cNvSpPr/>
+          <p:nvPr/>
+        </p:nvSpPr>
+        <p:spPr>
+          <a:xfrm>
+            <a:off x="6408000" y="3618359"/>
+            <a:ext cx="288032" cy="504056"/>
+          </a:xfrm>
+          <a:prstGeom prst="rect">
+            <a:avLst/>
+          </a:prstGeom>
+          <a:noFill/>
+        </p:spPr>
+        <p:style>
+          <a:lnRef idx="2">
+            <a:schemeClr val="accent1">
+              <a:shade val="50000"/>
+            </a:schemeClr>
+          </a:lnRef>
+          <a:fillRef idx="1">
+            <a:schemeClr val="accent1"/>
+          </a:fillRef>
+          <a:effectRef idx="0">
+            <a:schemeClr val="accent1"/>
+          </a:effectRef>
+          <a:fontRef idx="minor">
+            <a:schemeClr val="lt1"/>
+          </a:fontRef>
+        </p:style>
+        <p:txBody>
+          <a:bodyPr rtlCol="0" anchor="ctr"/>
+          <a:lstStyle/>
+          <a:p>
+            <a:pPr algn="ctr"/>
+            <a:endParaRPr lang="fr-FR"/>
+          </a:p>
+        </p:txBody>
+      </p:sp>
+      <p:cxnSp>
+        <p:nvCxnSpPr>
+          <p:cNvPr id="33" name="Connecteur droit 32"/>
+          <p:cNvCxnSpPr/>
+          <p:nvPr/>
+        </p:nvCxnSpPr>
+        <p:spPr>
+          <a:xfrm>
+            <a:off x="6696033" y="4122416"/>
+            <a:ext cx="829014" cy="1296143"/>
+          </a:xfrm>
+          <a:prstGeom prst="line">
+            <a:avLst/>
+          </a:prstGeom>
+          <a:ln w="19050">
+            <a:solidFill>
+              <a:schemeClr val="tx2"/>
+            </a:solidFill>
+          </a:ln>
+        </p:spPr>
+        <p:style>
+          <a:lnRef idx="1">
+            <a:schemeClr val="accent1"/>
+          </a:lnRef>
+          <a:fillRef idx="0">
+            <a:schemeClr val="accent1"/>
+          </a:fillRef>
+          <a:effectRef idx="0">
+            <a:schemeClr val="accent1"/>
+          </a:effectRef>
+          <a:fontRef idx="minor">
+            <a:schemeClr val="tx1"/>
+          </a:fontRef>
+        </p:style>
+      </p:cxnSp>
     </p:spTree>
     <p:extLst>
       <p:ext uri="{BB962C8B-B14F-4D97-AF65-F5344CB8AC3E}">

</xml_diff>

<commit_message>
Chap03: Change of picture for oscillation in pumpings
</commit_message>
<xml_diff>
--- a/03-h-Mn/Pictures/StrainAutocorPump.pptx
+++ b/03-h-Mn/Pictures/StrainAutocorPump.pptx
@@ -7,7 +7,7 @@
   <p:sldIdLst>
     <p:sldId id="256" r:id="rId2"/>
   </p:sldIdLst>
-  <p:sldSz cx="7561263" cy="7524750"/>
+  <p:sldSz cx="7561263" cy="5221288"/>
   <p:notesSz cx="6858000" cy="9144000"/>
   <p:defaultTextStyle>
     <a:defPPr>
@@ -136,8 +136,8 @@
         </p:nvSpPr>
         <p:spPr>
           <a:xfrm>
-            <a:off x="567100" y="2337554"/>
-            <a:ext cx="6427073" cy="1612944"/>
+            <a:off x="567100" y="1621989"/>
+            <a:ext cx="6427073" cy="1119193"/>
           </a:xfrm>
         </p:spPr>
         <p:txBody>
@@ -164,8 +164,8 @@
         </p:nvSpPr>
         <p:spPr>
           <a:xfrm>
-            <a:off x="1134194" y="4264028"/>
-            <a:ext cx="5292885" cy="1922994"/>
+            <a:off x="1134194" y="2958732"/>
+            <a:ext cx="5292885" cy="1334331"/>
           </a:xfrm>
         </p:spPr>
         <p:txBody>
@@ -288,7 +288,7 @@
           <a:p>
             <a:fld id="{0259FF92-1362-455E-ACBC-70B42DC48170}" type="datetimeFigureOut">
               <a:rPr lang="fr-FR" smtClean="0"/>
-              <a:t>17/10/2017</a:t>
+              <a:t>30/10/2017</a:t>
             </a:fld>
             <a:endParaRPr lang="fr-FR"/>
           </a:p>
@@ -458,7 +458,7 @@
           <a:p>
             <a:fld id="{0259FF92-1362-455E-ACBC-70B42DC48170}" type="datetimeFigureOut">
               <a:rPr lang="fr-FR" smtClean="0"/>
-              <a:t>17/10/2017</a:t>
+              <a:t>30/10/2017</a:t>
             </a:fld>
             <a:endParaRPr lang="fr-FR"/>
           </a:p>
@@ -548,8 +548,8 @@
         </p:nvSpPr>
         <p:spPr>
           <a:xfrm>
-            <a:off x="4317543" y="236892"/>
-            <a:ext cx="1338973" cy="5056564"/>
+            <a:off x="4317549" y="164377"/>
+            <a:ext cx="1338973" cy="3508659"/>
           </a:xfrm>
         </p:spPr>
         <p:txBody>
@@ -576,8 +576,8 @@
         </p:nvSpPr>
         <p:spPr>
           <a:xfrm>
-            <a:off x="297997" y="236892"/>
-            <a:ext cx="3893525" cy="5056564"/>
+            <a:off x="298003" y="164377"/>
+            <a:ext cx="3893525" cy="3508659"/>
           </a:xfrm>
         </p:spPr>
         <p:txBody>
@@ -638,7 +638,7 @@
           <a:p>
             <a:fld id="{0259FF92-1362-455E-ACBC-70B42DC48170}" type="datetimeFigureOut">
               <a:rPr lang="fr-FR" smtClean="0"/>
-              <a:t>17/10/2017</a:t>
+              <a:t>30/10/2017</a:t>
             </a:fld>
             <a:endParaRPr lang="fr-FR"/>
           </a:p>
@@ -808,7 +808,7 @@
           <a:p>
             <a:fld id="{0259FF92-1362-455E-ACBC-70B42DC48170}" type="datetimeFigureOut">
               <a:rPr lang="fr-FR" smtClean="0"/>
-              <a:t>17/10/2017</a:t>
+              <a:t>30/10/2017</a:t>
             </a:fld>
             <a:endParaRPr lang="fr-FR"/>
           </a:p>
@@ -898,8 +898,8 @@
         </p:nvSpPr>
         <p:spPr>
           <a:xfrm>
-            <a:off x="597296" y="4835349"/>
-            <a:ext cx="6427073" cy="1494500"/>
+            <a:off x="597296" y="3355163"/>
+            <a:ext cx="6427073" cy="1037007"/>
           </a:xfrm>
         </p:spPr>
         <p:txBody>
@@ -930,8 +930,8 @@
         </p:nvSpPr>
         <p:spPr>
           <a:xfrm>
-            <a:off x="597296" y="3189315"/>
-            <a:ext cx="6427073" cy="1646038"/>
+            <a:off x="597296" y="2213010"/>
+            <a:ext cx="6427073" cy="1142156"/>
           </a:xfrm>
         </p:spPr>
         <p:txBody>
@@ -1054,7 +1054,7 @@
           <a:p>
             <a:fld id="{0259FF92-1362-455E-ACBC-70B42DC48170}" type="datetimeFigureOut">
               <a:rPr lang="fr-FR" smtClean="0"/>
-              <a:t>17/10/2017</a:t>
+              <a:t>30/10/2017</a:t>
             </a:fld>
             <a:endParaRPr lang="fr-FR"/>
           </a:p>
@@ -1167,8 +1167,8 @@
         </p:nvSpPr>
         <p:spPr>
           <a:xfrm>
-            <a:off x="297997" y="1383024"/>
-            <a:ext cx="2616249" cy="3910433"/>
+            <a:off x="298003" y="959655"/>
+            <a:ext cx="2616249" cy="2713379"/>
           </a:xfrm>
         </p:spPr>
         <p:txBody>
@@ -1252,8 +1252,8 @@
         </p:nvSpPr>
         <p:spPr>
           <a:xfrm>
-            <a:off x="3040258" y="1383024"/>
-            <a:ext cx="2616250" cy="3910433"/>
+            <a:off x="3040258" y="959655"/>
+            <a:ext cx="2616250" cy="2713379"/>
           </a:xfrm>
         </p:spPr>
         <p:txBody>
@@ -1342,7 +1342,7 @@
           <a:p>
             <a:fld id="{0259FF92-1362-455E-ACBC-70B42DC48170}" type="datetimeFigureOut">
               <a:rPr lang="fr-FR" smtClean="0"/>
-              <a:t>17/10/2017</a:t>
+              <a:t>30/10/2017</a:t>
             </a:fld>
             <a:endParaRPr lang="fr-FR"/>
           </a:p>
@@ -1432,8 +1432,8 @@
         </p:nvSpPr>
         <p:spPr>
           <a:xfrm>
-            <a:off x="378064" y="301345"/>
-            <a:ext cx="6805136" cy="1254125"/>
+            <a:off x="378064" y="209100"/>
+            <a:ext cx="6805136" cy="870215"/>
           </a:xfrm>
         </p:spPr>
         <p:txBody>
@@ -1464,8 +1464,8 @@
         </p:nvSpPr>
         <p:spPr>
           <a:xfrm>
-            <a:off x="378063" y="1684363"/>
-            <a:ext cx="3340871" cy="701964"/>
+            <a:off x="378063" y="1168749"/>
+            <a:ext cx="3340871" cy="487080"/>
           </a:xfrm>
         </p:spPr>
         <p:txBody>
@@ -1529,8 +1529,8 @@
         </p:nvSpPr>
         <p:spPr>
           <a:xfrm>
-            <a:off x="378063" y="2386324"/>
-            <a:ext cx="3340871" cy="4335441"/>
+            <a:off x="378063" y="1655829"/>
+            <a:ext cx="3340871" cy="3008284"/>
           </a:xfrm>
         </p:spPr>
         <p:txBody>
@@ -1614,8 +1614,8 @@
         </p:nvSpPr>
         <p:spPr>
           <a:xfrm>
-            <a:off x="3841019" y="1684363"/>
-            <a:ext cx="3342184" cy="701964"/>
+            <a:off x="3841019" y="1168749"/>
+            <a:ext cx="3342184" cy="487080"/>
           </a:xfrm>
         </p:spPr>
         <p:txBody>
@@ -1679,8 +1679,8 @@
         </p:nvSpPr>
         <p:spPr>
           <a:xfrm>
-            <a:off x="3841019" y="2386324"/>
-            <a:ext cx="3342184" cy="4335441"/>
+            <a:off x="3841019" y="1655829"/>
+            <a:ext cx="3342184" cy="3008284"/>
           </a:xfrm>
         </p:spPr>
         <p:txBody>
@@ -1769,7 +1769,7 @@
           <a:p>
             <a:fld id="{0259FF92-1362-455E-ACBC-70B42DC48170}" type="datetimeFigureOut">
               <a:rPr lang="fr-FR" smtClean="0"/>
-              <a:t>17/10/2017</a:t>
+              <a:t>30/10/2017</a:t>
             </a:fld>
             <a:endParaRPr lang="fr-FR"/>
           </a:p>
@@ -1887,7 +1887,7 @@
           <a:p>
             <a:fld id="{0259FF92-1362-455E-ACBC-70B42DC48170}" type="datetimeFigureOut">
               <a:rPr lang="fr-FR" smtClean="0"/>
-              <a:t>17/10/2017</a:t>
+              <a:t>30/10/2017</a:t>
             </a:fld>
             <a:endParaRPr lang="fr-FR"/>
           </a:p>
@@ -1982,7 +1982,7 @@
           <a:p>
             <a:fld id="{0259FF92-1362-455E-ACBC-70B42DC48170}" type="datetimeFigureOut">
               <a:rPr lang="fr-FR" smtClean="0"/>
-              <a:t>17/10/2017</a:t>
+              <a:t>30/10/2017</a:t>
             </a:fld>
             <a:endParaRPr lang="fr-FR"/>
           </a:p>
@@ -2072,8 +2072,8 @@
         </p:nvSpPr>
         <p:spPr>
           <a:xfrm>
-            <a:off x="378073" y="299601"/>
-            <a:ext cx="2487603" cy="1275025"/>
+            <a:off x="378079" y="207890"/>
+            <a:ext cx="2487603" cy="884717"/>
           </a:xfrm>
         </p:spPr>
         <p:txBody>
@@ -2104,8 +2104,8 @@
         </p:nvSpPr>
         <p:spPr>
           <a:xfrm>
-            <a:off x="2956248" y="299599"/>
-            <a:ext cx="4226956" cy="6422165"/>
+            <a:off x="2956248" y="207887"/>
+            <a:ext cx="4226956" cy="4456224"/>
           </a:xfrm>
         </p:spPr>
         <p:txBody>
@@ -2189,8 +2189,8 @@
         </p:nvSpPr>
         <p:spPr>
           <a:xfrm>
-            <a:off x="378073" y="1574628"/>
-            <a:ext cx="2487603" cy="5147138"/>
+            <a:off x="378079" y="1092606"/>
+            <a:ext cx="2487603" cy="3571506"/>
           </a:xfrm>
         </p:spPr>
         <p:txBody>
@@ -2259,7 +2259,7 @@
           <a:p>
             <a:fld id="{0259FF92-1362-455E-ACBC-70B42DC48170}" type="datetimeFigureOut">
               <a:rPr lang="fr-FR" smtClean="0"/>
-              <a:t>17/10/2017</a:t>
+              <a:t>30/10/2017</a:t>
             </a:fld>
             <a:endParaRPr lang="fr-FR"/>
           </a:p>
@@ -2349,8 +2349,8 @@
         </p:nvSpPr>
         <p:spPr>
           <a:xfrm>
-            <a:off x="1482064" y="5267328"/>
-            <a:ext cx="4536758" cy="621838"/>
+            <a:off x="1482064" y="3654905"/>
+            <a:ext cx="4536758" cy="431483"/>
           </a:xfrm>
         </p:spPr>
         <p:txBody>
@@ -2381,8 +2381,8 @@
         </p:nvSpPr>
         <p:spPr>
           <a:xfrm>
-            <a:off x="1482064" y="672354"/>
-            <a:ext cx="4536758" cy="4514850"/>
+            <a:off x="1482064" y="466536"/>
+            <a:ext cx="4536758" cy="3132773"/>
           </a:xfrm>
         </p:spPr>
         <p:txBody>
@@ -2442,8 +2442,8 @@
         </p:nvSpPr>
         <p:spPr>
           <a:xfrm>
-            <a:off x="1482064" y="5889166"/>
-            <a:ext cx="4536758" cy="883115"/>
+            <a:off x="1482064" y="4086386"/>
+            <a:ext cx="4536758" cy="612778"/>
           </a:xfrm>
         </p:spPr>
         <p:txBody>
@@ -2512,7 +2512,7 @@
           <a:p>
             <a:fld id="{0259FF92-1362-455E-ACBC-70B42DC48170}" type="datetimeFigureOut">
               <a:rPr lang="fr-FR" smtClean="0"/>
-              <a:t>17/10/2017</a:t>
+              <a:t>30/10/2017</a:t>
             </a:fld>
             <a:endParaRPr lang="fr-FR"/>
           </a:p>
@@ -2607,8 +2607,8 @@
         </p:nvSpPr>
         <p:spPr>
           <a:xfrm>
-            <a:off x="378064" y="301345"/>
-            <a:ext cx="6805136" cy="1254125"/>
+            <a:off x="378064" y="209100"/>
+            <a:ext cx="6805136" cy="870215"/>
           </a:xfrm>
           <a:prstGeom prst="rect">
             <a:avLst/>
@@ -2640,8 +2640,8 @@
         </p:nvSpPr>
         <p:spPr>
           <a:xfrm>
-            <a:off x="378064" y="1755781"/>
-            <a:ext cx="6805136" cy="4965987"/>
+            <a:off x="378064" y="1218306"/>
+            <a:ext cx="6805136" cy="3445809"/>
           </a:xfrm>
           <a:prstGeom prst="rect">
             <a:avLst/>
@@ -2702,8 +2702,8 @@
         </p:nvSpPr>
         <p:spPr>
           <a:xfrm>
-            <a:off x="378072" y="6974332"/>
-            <a:ext cx="1764295" cy="400623"/>
+            <a:off x="378078" y="4839364"/>
+            <a:ext cx="1764295" cy="277985"/>
           </a:xfrm>
           <a:prstGeom prst="rect">
             <a:avLst/>
@@ -2725,7 +2725,7 @@
           <a:p>
             <a:fld id="{0259FF92-1362-455E-ACBC-70B42DC48170}" type="datetimeFigureOut">
               <a:rPr lang="fr-FR" smtClean="0"/>
-              <a:t>17/10/2017</a:t>
+              <a:t>30/10/2017</a:t>
             </a:fld>
             <a:endParaRPr lang="fr-FR"/>
           </a:p>
@@ -2743,8 +2743,8 @@
         </p:nvSpPr>
         <p:spPr>
           <a:xfrm>
-            <a:off x="2583434" y="6974332"/>
-            <a:ext cx="2394400" cy="400623"/>
+            <a:off x="2583434" y="4839364"/>
+            <a:ext cx="2394400" cy="277985"/>
           </a:xfrm>
           <a:prstGeom prst="rect">
             <a:avLst/>
@@ -2780,8 +2780,8 @@
         </p:nvSpPr>
         <p:spPr>
           <a:xfrm>
-            <a:off x="5418913" y="6974332"/>
-            <a:ext cx="1764295" cy="400623"/>
+            <a:off x="5418919" y="4839364"/>
+            <a:ext cx="1764295" cy="277985"/>
           </a:xfrm>
           <a:prstGeom prst="rect">
             <a:avLst/>
@@ -3102,7 +3102,7 @@
       </p:grpSpPr>
       <p:pic>
         <p:nvPicPr>
-          <p:cNvPr id="25" name="Picture 2"/>
+          <p:cNvPr id="13" name="Picture 2"/>
           <p:cNvPicPr>
             <a:picLocks noChangeAspect="1" noChangeArrowheads="1"/>
           </p:cNvPicPr>
@@ -3156,337 +3156,42 @@
       </p:pic>
       <p:sp>
         <p:nvSpPr>
-          <p:cNvPr id="2" name="Rectangle 1"/>
-          <p:cNvSpPr/>
+          <p:cNvPr id="2" name="ZoneTexte 1"/>
+          <p:cNvSpPr txBox="1"/>
           <p:nvPr/>
         </p:nvSpPr>
         <p:spPr>
           <a:xfrm>
-            <a:off x="972319" y="3474343"/>
-            <a:ext cx="288032" cy="504056"/>
+            <a:off x="6834341" y="450404"/>
+            <a:ext cx="402674" cy="307777"/>
           </a:xfrm>
           <a:prstGeom prst="rect">
             <a:avLst/>
           </a:prstGeom>
-          <a:noFill/>
+          <a:solidFill>
+            <a:schemeClr val="bg1"/>
+          </a:solidFill>
         </p:spPr>
-        <p:style>
-          <a:lnRef idx="2">
-            <a:schemeClr val="accent1">
-              <a:shade val="50000"/>
-            </a:schemeClr>
-          </a:lnRef>
-          <a:fillRef idx="1">
-            <a:schemeClr val="accent1"/>
-          </a:fillRef>
-          <a:effectRef idx="0">
-            <a:schemeClr val="accent1"/>
-          </a:effectRef>
-          <a:fontRef idx="minor">
-            <a:schemeClr val="lt1"/>
-          </a:fontRef>
-        </p:style>
-        <p:txBody>
-          <a:bodyPr rtlCol="0" anchor="ctr"/>
-          <a:lstStyle/>
-          <a:p>
-            <a:pPr algn="ctr"/>
-            <a:endParaRPr lang="fr-FR"/>
-          </a:p>
-        </p:txBody>
-      </p:sp>
-      <p:cxnSp>
-        <p:nvCxnSpPr>
-          <p:cNvPr id="4" name="Connecteur droit 3"/>
-          <p:cNvCxnSpPr/>
-          <p:nvPr/>
-        </p:nvCxnSpPr>
-        <p:spPr>
-          <a:xfrm flipH="1">
-            <a:off x="580566" y="3978399"/>
-            <a:ext cx="391753" cy="1440160"/>
-          </a:xfrm>
-          <a:prstGeom prst="line">
-            <a:avLst/>
-          </a:prstGeom>
-          <a:ln w="19050">
-            <a:solidFill>
-              <a:schemeClr val="tx2"/>
-            </a:solidFill>
-          </a:ln>
-        </p:spPr>
-        <p:style>
-          <a:lnRef idx="1">
-            <a:schemeClr val="accent1"/>
-          </a:lnRef>
-          <a:fillRef idx="0">
-            <a:schemeClr val="accent1"/>
-          </a:fillRef>
-          <a:effectRef idx="0">
-            <a:schemeClr val="accent1"/>
-          </a:effectRef>
-          <a:fontRef idx="minor">
-            <a:schemeClr val="tx1"/>
-          </a:fontRef>
-        </p:style>
-      </p:cxnSp>
-      <p:cxnSp>
-        <p:nvCxnSpPr>
-          <p:cNvPr id="7" name="Connecteur droit 6"/>
-          <p:cNvCxnSpPr/>
-          <p:nvPr/>
-        </p:nvCxnSpPr>
-        <p:spPr>
-          <a:xfrm>
-            <a:off x="1260351" y="3978399"/>
-            <a:ext cx="1080120" cy="1440160"/>
-          </a:xfrm>
-          <a:prstGeom prst="line">
-            <a:avLst/>
-          </a:prstGeom>
-          <a:ln w="19050">
-            <a:solidFill>
-              <a:schemeClr val="tx2"/>
-            </a:solidFill>
-          </a:ln>
-        </p:spPr>
-        <p:style>
-          <a:lnRef idx="1">
-            <a:schemeClr val="accent1"/>
-          </a:lnRef>
-          <a:fillRef idx="0">
-            <a:schemeClr val="accent1"/>
-          </a:fillRef>
-          <a:effectRef idx="0">
-            <a:schemeClr val="accent1"/>
-          </a:effectRef>
-          <a:fontRef idx="minor">
-            <a:schemeClr val="tx1"/>
-          </a:fontRef>
-        </p:style>
-      </p:cxnSp>
-      <p:sp>
-        <p:nvSpPr>
-          <p:cNvPr id="14" name="Rectangle 13"/>
-          <p:cNvSpPr/>
-          <p:nvPr/>
-        </p:nvSpPr>
-        <p:spPr>
-          <a:xfrm>
-            <a:off x="5076775" y="3474343"/>
-            <a:ext cx="288032" cy="504056"/>
-          </a:xfrm>
-          <a:prstGeom prst="rect">
-            <a:avLst/>
-          </a:prstGeom>
-          <a:noFill/>
-        </p:spPr>
-        <p:style>
-          <a:lnRef idx="2">
-            <a:schemeClr val="accent1">
-              <a:shade val="50000"/>
-            </a:schemeClr>
-          </a:lnRef>
-          <a:fillRef idx="1">
-            <a:schemeClr val="accent1"/>
-          </a:fillRef>
-          <a:effectRef idx="0">
-            <a:schemeClr val="accent1"/>
-          </a:effectRef>
-          <a:fontRef idx="minor">
-            <a:schemeClr val="lt1"/>
-          </a:fontRef>
-        </p:style>
-        <p:txBody>
-          <a:bodyPr rtlCol="0" anchor="ctr"/>
-          <a:lstStyle/>
-          <a:p>
-            <a:pPr algn="ctr"/>
-            <a:endParaRPr lang="fr-FR"/>
-          </a:p>
-        </p:txBody>
-      </p:sp>
-      <p:cxnSp>
-        <p:nvCxnSpPr>
-          <p:cNvPr id="15" name="Connecteur droit 14"/>
-          <p:cNvCxnSpPr/>
-          <p:nvPr/>
-        </p:nvCxnSpPr>
-        <p:spPr>
-          <a:xfrm flipH="1">
-            <a:off x="3178800" y="3978399"/>
-            <a:ext cx="1897975" cy="1440160"/>
-          </a:xfrm>
-          <a:prstGeom prst="line">
-            <a:avLst/>
-          </a:prstGeom>
-          <a:ln w="19050">
-            <a:solidFill>
-              <a:schemeClr val="tx2"/>
-            </a:solidFill>
-          </a:ln>
-        </p:spPr>
-        <p:style>
-          <a:lnRef idx="1">
-            <a:schemeClr val="accent1"/>
-          </a:lnRef>
-          <a:fillRef idx="0">
-            <a:schemeClr val="accent1"/>
-          </a:fillRef>
-          <a:effectRef idx="0">
-            <a:schemeClr val="accent1"/>
-          </a:effectRef>
-          <a:fontRef idx="minor">
-            <a:schemeClr val="tx1"/>
-          </a:fontRef>
-        </p:style>
-      </p:cxnSp>
-      <p:cxnSp>
-        <p:nvCxnSpPr>
-          <p:cNvPr id="20" name="Connecteur droit 19"/>
-          <p:cNvCxnSpPr/>
-          <p:nvPr/>
-        </p:nvCxnSpPr>
-        <p:spPr>
-          <a:xfrm flipH="1">
-            <a:off x="4932759" y="3978399"/>
-            <a:ext cx="432050" cy="1440160"/>
-          </a:xfrm>
-          <a:prstGeom prst="line">
-            <a:avLst/>
-          </a:prstGeom>
-          <a:ln w="19050">
-            <a:solidFill>
-              <a:schemeClr val="tx2"/>
-            </a:solidFill>
-          </a:ln>
-        </p:spPr>
-        <p:style>
-          <a:lnRef idx="1">
-            <a:schemeClr val="accent1"/>
-          </a:lnRef>
-          <a:fillRef idx="0">
-            <a:schemeClr val="accent1"/>
-          </a:fillRef>
-          <a:effectRef idx="0">
-            <a:schemeClr val="accent1"/>
-          </a:effectRef>
-          <a:fontRef idx="minor">
-            <a:schemeClr val="tx1"/>
-          </a:fontRef>
-        </p:style>
-      </p:cxnSp>
-      <p:cxnSp>
-        <p:nvCxnSpPr>
-          <p:cNvPr id="26" name="Connecteur droit 25"/>
-          <p:cNvCxnSpPr/>
-          <p:nvPr/>
-        </p:nvCxnSpPr>
-        <p:spPr>
-          <a:xfrm flipH="1">
-            <a:off x="5781600" y="4122416"/>
-            <a:ext cx="626403" cy="1296143"/>
-          </a:xfrm>
-          <a:prstGeom prst="line">
-            <a:avLst/>
-          </a:prstGeom>
-          <a:ln w="19050">
-            <a:solidFill>
-              <a:schemeClr val="tx2"/>
-            </a:solidFill>
-          </a:ln>
-        </p:spPr>
-        <p:style>
-          <a:lnRef idx="1">
-            <a:schemeClr val="accent1"/>
-          </a:lnRef>
-          <a:fillRef idx="0">
-            <a:schemeClr val="accent1"/>
-          </a:fillRef>
-          <a:effectRef idx="0">
-            <a:schemeClr val="accent1"/>
-          </a:effectRef>
-          <a:fontRef idx="minor">
-            <a:schemeClr val="tx1"/>
-          </a:fontRef>
-        </p:style>
-      </p:cxnSp>
-      <p:sp>
-        <p:nvSpPr>
-          <p:cNvPr id="28" name="Rectangle 27"/>
-          <p:cNvSpPr/>
-          <p:nvPr/>
-        </p:nvSpPr>
-        <p:spPr>
-          <a:xfrm>
-            <a:off x="6408000" y="3618359"/>
-            <a:ext cx="288032" cy="504056"/>
-          </a:xfrm>
-          <a:prstGeom prst="rect">
-            <a:avLst/>
-          </a:prstGeom>
-          <a:noFill/>
-        </p:spPr>
-        <p:style>
-          <a:lnRef idx="2">
-            <a:schemeClr val="accent1">
-              <a:shade val="50000"/>
-            </a:schemeClr>
-          </a:lnRef>
-          <a:fillRef idx="1">
-            <a:schemeClr val="accent1"/>
-          </a:fillRef>
-          <a:effectRef idx="0">
-            <a:schemeClr val="accent1"/>
-          </a:effectRef>
-          <a:fontRef idx="minor">
-            <a:schemeClr val="lt1"/>
-          </a:fontRef>
-        </p:style>
-        <p:txBody>
-          <a:bodyPr rtlCol="0" anchor="ctr"/>
-          <a:lstStyle/>
-          <a:p>
-            <a:pPr algn="ctr"/>
-            <a:endParaRPr lang="fr-FR"/>
-          </a:p>
-        </p:txBody>
-      </p:sp>
-      <p:cxnSp>
-        <p:nvCxnSpPr>
-          <p:cNvPr id="33" name="Connecteur droit 32"/>
-          <p:cNvCxnSpPr/>
-          <p:nvPr/>
-        </p:nvCxnSpPr>
-        <p:spPr>
-          <a:xfrm>
-            <a:off x="6696033" y="4122416"/>
-            <a:ext cx="829014" cy="1296143"/>
-          </a:xfrm>
-          <a:prstGeom prst="line">
-            <a:avLst/>
-          </a:prstGeom>
-          <a:ln w="19050">
-            <a:solidFill>
-              <a:schemeClr val="tx2"/>
-            </a:solidFill>
-          </a:ln>
-        </p:spPr>
-        <p:style>
-          <a:lnRef idx="1">
-            <a:schemeClr val="accent1"/>
-          </a:lnRef>
-          <a:fillRef idx="0">
-            <a:schemeClr val="accent1"/>
-          </a:fillRef>
-          <a:effectRef idx="0">
-            <a:schemeClr val="accent1"/>
-          </a:effectRef>
-          <a:fontRef idx="minor">
-            <a:schemeClr val="tx1"/>
-          </a:fontRef>
-        </p:style>
-      </p:cxnSp>
+        <p:txBody>
+          <a:bodyPr wrap="none" rtlCol="0">
+            <a:spAutoFit/>
+          </a:bodyPr>
+          <a:lstStyle/>
+          <a:p>
+            <a:r>
+              <a:rPr lang="fr-FR" b="1" dirty="0" smtClean="0">
+                <a:latin typeface="Times New Roman" panose="02020603050405020304" pitchFamily="18" charset="0"/>
+                <a:cs typeface="Times New Roman" panose="02020603050405020304" pitchFamily="18" charset="0"/>
+              </a:rPr>
+              <a:t>(b)</a:t>
+            </a:r>
+            <a:endParaRPr lang="fr-FR" b="1" dirty="0">
+              <a:latin typeface="Times New Roman" panose="02020603050405020304" pitchFamily="18" charset="0"/>
+              <a:cs typeface="Times New Roman" panose="02020603050405020304" pitchFamily="18" charset="0"/>
+            </a:endParaRPr>
+          </a:p>
+        </p:txBody>
+      </p:sp>
     </p:spTree>
     <p:extLst>
       <p:ext uri="{BB962C8B-B14F-4D97-AF65-F5344CB8AC3E}">

</xml_diff>